<commit_message>
updated lecture slides and notes
</commit_message>
<xml_diff>
--- a/docs/lecture_slides/Week 3/Week3_Lecture5_Slides_1_24_2024.pptx
+++ b/docs/lecture_slides/Week 3/Week3_Lecture5_Slides_1_24_2024.pptx
@@ -11,21 +11,22 @@
     <p:sldId id="320" r:id="rId5"/>
     <p:sldId id="322" r:id="rId6"/>
     <p:sldId id="324" r:id="rId7"/>
-    <p:sldId id="303" r:id="rId8"/>
-    <p:sldId id="259" r:id="rId9"/>
-    <p:sldId id="325" r:id="rId10"/>
-    <p:sldId id="346" r:id="rId11"/>
-    <p:sldId id="339" r:id="rId12"/>
-    <p:sldId id="341" r:id="rId13"/>
-    <p:sldId id="340" r:id="rId14"/>
-    <p:sldId id="345" r:id="rId15"/>
-    <p:sldId id="313" r:id="rId16"/>
-    <p:sldId id="347" r:id="rId17"/>
-    <p:sldId id="314" r:id="rId18"/>
-    <p:sldId id="315" r:id="rId19"/>
-    <p:sldId id="316" r:id="rId20"/>
-    <p:sldId id="317" r:id="rId21"/>
-    <p:sldId id="283" r:id="rId22"/>
+    <p:sldId id="348" r:id="rId8"/>
+    <p:sldId id="303" r:id="rId9"/>
+    <p:sldId id="259" r:id="rId10"/>
+    <p:sldId id="325" r:id="rId11"/>
+    <p:sldId id="346" r:id="rId12"/>
+    <p:sldId id="339" r:id="rId13"/>
+    <p:sldId id="341" r:id="rId14"/>
+    <p:sldId id="340" r:id="rId15"/>
+    <p:sldId id="349" r:id="rId16"/>
+    <p:sldId id="345" r:id="rId17"/>
+    <p:sldId id="313" r:id="rId18"/>
+    <p:sldId id="314" r:id="rId19"/>
+    <p:sldId id="315" r:id="rId20"/>
+    <p:sldId id="316" r:id="rId21"/>
+    <p:sldId id="317" r:id="rId22"/>
+    <p:sldId id="283" r:id="rId23"/>
   </p:sldIdLst>
   <p:sldSz cx="12192000" cy="6858000"/>
   <p:notesSz cx="6858000" cy="9144000"/>
@@ -279,7 +280,7 @@
           <a:p>
             <a:fld id="{06882561-BD16-4A95-ACA1-5204E478F2FE}" type="datetimeFigureOut">
               <a:rPr lang="en-US" smtClean="0"/>
-              <a:t>1/23/2024</a:t>
+              <a:t>1/24/2024</a:t>
             </a:fld>
             <a:endParaRPr lang="en-US"/>
           </a:p>
@@ -477,7 +478,7 @@
           <a:p>
             <a:fld id="{06882561-BD16-4A95-ACA1-5204E478F2FE}" type="datetimeFigureOut">
               <a:rPr lang="en-US" smtClean="0"/>
-              <a:t>1/23/2024</a:t>
+              <a:t>1/24/2024</a:t>
             </a:fld>
             <a:endParaRPr lang="en-US"/>
           </a:p>
@@ -685,7 +686,7 @@
           <a:p>
             <a:fld id="{06882561-BD16-4A95-ACA1-5204E478F2FE}" type="datetimeFigureOut">
               <a:rPr lang="en-US" smtClean="0"/>
-              <a:t>1/23/2024</a:t>
+              <a:t>1/24/2024</a:t>
             </a:fld>
             <a:endParaRPr lang="en-US"/>
           </a:p>
@@ -883,7 +884,7 @@
           <a:p>
             <a:fld id="{06882561-BD16-4A95-ACA1-5204E478F2FE}" type="datetimeFigureOut">
               <a:rPr lang="en-US" smtClean="0"/>
-              <a:t>1/23/2024</a:t>
+              <a:t>1/24/2024</a:t>
             </a:fld>
             <a:endParaRPr lang="en-US"/>
           </a:p>
@@ -1158,7 +1159,7 @@
           <a:p>
             <a:fld id="{06882561-BD16-4A95-ACA1-5204E478F2FE}" type="datetimeFigureOut">
               <a:rPr lang="en-US" smtClean="0"/>
-              <a:t>1/23/2024</a:t>
+              <a:t>1/24/2024</a:t>
             </a:fld>
             <a:endParaRPr lang="en-US"/>
           </a:p>
@@ -1423,7 +1424,7 @@
           <a:p>
             <a:fld id="{06882561-BD16-4A95-ACA1-5204E478F2FE}" type="datetimeFigureOut">
               <a:rPr lang="en-US" smtClean="0"/>
-              <a:t>1/23/2024</a:t>
+              <a:t>1/24/2024</a:t>
             </a:fld>
             <a:endParaRPr lang="en-US"/>
           </a:p>
@@ -1835,7 +1836,7 @@
           <a:p>
             <a:fld id="{06882561-BD16-4A95-ACA1-5204E478F2FE}" type="datetimeFigureOut">
               <a:rPr lang="en-US" smtClean="0"/>
-              <a:t>1/23/2024</a:t>
+              <a:t>1/24/2024</a:t>
             </a:fld>
             <a:endParaRPr lang="en-US"/>
           </a:p>
@@ -1976,7 +1977,7 @@
           <a:p>
             <a:fld id="{06882561-BD16-4A95-ACA1-5204E478F2FE}" type="datetimeFigureOut">
               <a:rPr lang="en-US" smtClean="0"/>
-              <a:t>1/23/2024</a:t>
+              <a:t>1/24/2024</a:t>
             </a:fld>
             <a:endParaRPr lang="en-US"/>
           </a:p>
@@ -2089,7 +2090,7 @@
           <a:p>
             <a:fld id="{06882561-BD16-4A95-ACA1-5204E478F2FE}" type="datetimeFigureOut">
               <a:rPr lang="en-US" smtClean="0"/>
-              <a:t>1/23/2024</a:t>
+              <a:t>1/24/2024</a:t>
             </a:fld>
             <a:endParaRPr lang="en-US"/>
           </a:p>
@@ -2400,7 +2401,7 @@
           <a:p>
             <a:fld id="{06882561-BD16-4A95-ACA1-5204E478F2FE}" type="datetimeFigureOut">
               <a:rPr lang="en-US" smtClean="0"/>
-              <a:t>1/23/2024</a:t>
+              <a:t>1/24/2024</a:t>
             </a:fld>
             <a:endParaRPr lang="en-US"/>
           </a:p>
@@ -2688,7 +2689,7 @@
           <a:p>
             <a:fld id="{06882561-BD16-4A95-ACA1-5204E478F2FE}" type="datetimeFigureOut">
               <a:rPr lang="en-US" smtClean="0"/>
-              <a:t>1/23/2024</a:t>
+              <a:t>1/24/2024</a:t>
             </a:fld>
             <a:endParaRPr lang="en-US"/>
           </a:p>
@@ -2929,7 +2930,7 @@
           <a:p>
             <a:fld id="{06882561-BD16-4A95-ACA1-5204E478F2FE}" type="datetimeFigureOut">
               <a:rPr lang="en-US" smtClean="0"/>
-              <a:t>1/23/2024</a:t>
+              <a:t>1/24/2024</a:t>
             </a:fld>
             <a:endParaRPr lang="en-US"/>
           </a:p>
@@ -3383,31 +3384,6 @@
           </a:p>
         </p:txBody>
       </p:sp>
-      <p:sp>
-        <p:nvSpPr>
-          <p:cNvPr id="3" name="Subtitle 2">
-            <a:extLst>
-              <a:ext uri="{FF2B5EF4-FFF2-40B4-BE49-F238E27FC236}">
-                <a16:creationId xmlns:a16="http://schemas.microsoft.com/office/drawing/2014/main" id="{7BE6A09E-BC4D-7AB6-B5F8-C03B2A011743}"/>
-              </a:ext>
-            </a:extLst>
-          </p:cNvPr>
-          <p:cNvSpPr>
-            <a:spLocks noGrp="1"/>
-          </p:cNvSpPr>
-          <p:nvPr>
-            <p:ph type="subTitle" idx="1"/>
-          </p:nvPr>
-        </p:nvSpPr>
-        <p:spPr/>
-        <p:txBody>
-          <a:bodyPr/>
-          <a:lstStyle/>
-          <a:p>
-            <a:endParaRPr lang="en-US" dirty="0"/>
-          </a:p>
-        </p:txBody>
-      </p:sp>
     </p:spTree>
     <p:extLst>
       <p:ext uri="{BB962C8B-B14F-4D97-AF65-F5344CB8AC3E}">
@@ -3422,6 +3398,263 @@
 </file>
 
 <file path=ppt/slides/slide10.xml><?xml version="1.0" encoding="utf-8"?>
+<p:sld xmlns:a="http://schemas.openxmlformats.org/drawingml/2006/main" xmlns:r="http://schemas.openxmlformats.org/officeDocument/2006/relationships" xmlns:p="http://schemas.openxmlformats.org/presentationml/2006/main">
+  <p:cSld>
+    <p:spTree>
+      <p:nvGrpSpPr>
+        <p:cNvPr id="1" name=""/>
+        <p:cNvGrpSpPr/>
+        <p:nvPr/>
+      </p:nvGrpSpPr>
+      <p:grpSpPr>
+        <a:xfrm>
+          <a:off x="0" y="0"/>
+          <a:ext cx="0" cy="0"/>
+          <a:chOff x="0" y="0"/>
+          <a:chExt cx="0" cy="0"/>
+        </a:xfrm>
+      </p:grpSpPr>
+      <p:sp>
+        <p:nvSpPr>
+          <p:cNvPr id="2" name="Title 1">
+            <a:extLst>
+              <a:ext uri="{FF2B5EF4-FFF2-40B4-BE49-F238E27FC236}">
+                <a16:creationId xmlns:a16="http://schemas.microsoft.com/office/drawing/2014/main" id="{506D6BCC-CAB3-F735-AC9E-6A7940310802}"/>
+              </a:ext>
+            </a:extLst>
+          </p:cNvPr>
+          <p:cNvSpPr>
+            <a:spLocks noGrp="1"/>
+          </p:cNvSpPr>
+          <p:nvPr>
+            <p:ph type="title"/>
+          </p:nvPr>
+        </p:nvSpPr>
+        <p:spPr/>
+        <p:txBody>
+          <a:bodyPr/>
+          <a:lstStyle/>
+          <a:p>
+            <a:r>
+              <a:rPr lang="en-US" sz="4400" dirty="0"/>
+              <a:t>Measures of Spread: Interquartile Range</a:t>
+            </a:r>
+            <a:endParaRPr lang="en-US" dirty="0"/>
+          </a:p>
+        </p:txBody>
+      </p:sp>
+      <mc:AlternateContent xmlns:mc="http://schemas.openxmlformats.org/markup-compatibility/2006" xmlns:a14="http://schemas.microsoft.com/office/drawing/2010/main">
+        <mc:Choice Requires="a14">
+          <p:sp>
+            <p:nvSpPr>
+              <p:cNvPr id="3" name="Content Placeholder 2">
+                <a:extLst>
+                  <a:ext uri="{FF2B5EF4-FFF2-40B4-BE49-F238E27FC236}">
+                    <a16:creationId xmlns:a16="http://schemas.microsoft.com/office/drawing/2014/main" id="{748E8586-DD23-94D2-D323-FAF1EE2B0EC8}"/>
+                  </a:ext>
+                </a:extLst>
+              </p:cNvPr>
+              <p:cNvSpPr>
+                <a:spLocks noGrp="1"/>
+              </p:cNvSpPr>
+              <p:nvPr>
+                <p:ph idx="1"/>
+              </p:nvPr>
+            </p:nvSpPr>
+            <p:spPr/>
+            <p:txBody>
+              <a:bodyPr>
+                <a:normAutofit lnSpcReduction="10000"/>
+              </a:bodyPr>
+              <a:lstStyle/>
+              <a:p>
+                <a:r>
+                  <a:rPr lang="en-US" dirty="0"/>
+                  <a:t>The </a:t>
+                </a:r>
+                <a:r>
+                  <a:rPr lang="en-US" b="1" dirty="0"/>
+                  <a:t>interquartile range (IQR)</a:t>
+                </a:r>
+                <a:r>
+                  <a:rPr lang="en-US" dirty="0"/>
+                  <a:t> measures the spread of the middle 50% of the observations </a:t>
+                </a:r>
+              </a:p>
+              <a:p>
+                <a:endParaRPr lang="en-US" dirty="0"/>
+              </a:p>
+              <a:p>
+                <a:r>
+                  <a:rPr lang="en-US" dirty="0"/>
+                  <a:t>It is resistant to outliers</a:t>
+                </a:r>
+              </a:p>
+              <a:p>
+                <a:pPr marL="0" indent="0" algn="ctr">
+                  <a:buNone/>
+                </a:pPr>
+                <a:endParaRPr lang="en-US" sz="2400" b="1" i="1" dirty="0">
+                  <a:latin typeface="Cambria Math" panose="02040503050406030204" pitchFamily="18" charset="0"/>
+                </a:endParaRPr>
+              </a:p>
+              <a:p>
+                <a:pPr marL="0" indent="0" algn="ctr">
+                  <a:buNone/>
+                </a:pPr>
+                <a14:m>
+                  <m:oMathPara xmlns:m="http://schemas.openxmlformats.org/officeDocument/2006/math">
+                    <m:oMathParaPr>
+                      <m:jc m:val="centerGroup"/>
+                    </m:oMathParaPr>
+                    <m:oMath xmlns:m="http://schemas.openxmlformats.org/officeDocument/2006/math">
+                      <m:r>
+                        <a:rPr lang="en-US" sz="2400" b="1" i="1" smtClean="0">
+                          <a:latin typeface="Cambria Math" panose="02040503050406030204" pitchFamily="18" charset="0"/>
+                        </a:rPr>
+                        <m:t>𝑰𝑸𝑹</m:t>
+                      </m:r>
+                      <m:r>
+                        <a:rPr lang="en-US" sz="2400" b="1" i="1" smtClean="0">
+                          <a:latin typeface="Cambria Math" panose="02040503050406030204" pitchFamily="18" charset="0"/>
+                        </a:rPr>
+                        <m:t>=</m:t>
+                      </m:r>
+                      <m:r>
+                        <a:rPr lang="en-US" sz="2400" b="1" i="1" smtClean="0">
+                          <a:latin typeface="Cambria Math" panose="02040503050406030204" pitchFamily="18" charset="0"/>
+                        </a:rPr>
+                        <m:t>𝑸</m:t>
+                      </m:r>
+                      <m:r>
+                        <a:rPr lang="en-US" sz="2400" b="1" i="1" smtClean="0">
+                          <a:latin typeface="Cambria Math" panose="02040503050406030204" pitchFamily="18" charset="0"/>
+                        </a:rPr>
+                        <m:t>𝟑</m:t>
+                      </m:r>
+                      <m:r>
+                        <a:rPr lang="en-US" sz="2400" b="1" i="1" smtClean="0">
+                          <a:latin typeface="Cambria Math" panose="02040503050406030204" pitchFamily="18" charset="0"/>
+                        </a:rPr>
+                        <m:t> −</m:t>
+                      </m:r>
+                      <m:r>
+                        <a:rPr lang="en-US" sz="2400" b="1" i="1" smtClean="0">
+                          <a:latin typeface="Cambria Math" panose="02040503050406030204" pitchFamily="18" charset="0"/>
+                        </a:rPr>
+                        <m:t>𝑸</m:t>
+                      </m:r>
+                      <m:r>
+                        <a:rPr lang="en-US" sz="2400" b="1" i="1" smtClean="0">
+                          <a:latin typeface="Cambria Math" panose="02040503050406030204" pitchFamily="18" charset="0"/>
+                        </a:rPr>
+                        <m:t>𝟏</m:t>
+                      </m:r>
+                    </m:oMath>
+                  </m:oMathPara>
+                </a14:m>
+                <a:endParaRPr lang="en-US" sz="2400" b="1" dirty="0"/>
+              </a:p>
+              <a:p>
+                <a:pPr marL="0" indent="0" algn="ctr">
+                  <a:buNone/>
+                </a:pPr>
+                <a:endParaRPr lang="en-US" sz="2400" b="1" dirty="0"/>
+              </a:p>
+              <a:p>
+                <a:r>
+                  <a:rPr lang="en-US" sz="2400" dirty="0"/>
+                  <a:t>The more variability the larger the value of the </a:t>
+                </a:r>
+                <a:r>
+                  <a:rPr lang="en-US" sz="2400" b="1" dirty="0"/>
+                  <a:t>IQR</a:t>
+                </a:r>
+                <a:r>
+                  <a:rPr lang="en-US" sz="2400" dirty="0"/>
+                  <a:t> </a:t>
+                </a:r>
+              </a:p>
+              <a:p>
+                <a:endParaRPr lang="en-US" sz="2400" dirty="0"/>
+              </a:p>
+              <a:p>
+                <a:r>
+                  <a:rPr lang="en-US" sz="2400" b="1" dirty="0"/>
+                  <a:t>IQR </a:t>
+                </a:r>
+                <a:r>
+                  <a:rPr lang="en-US" sz="2400" dirty="0"/>
+                  <a:t>is a good choice for distributions that are highly skewed!</a:t>
+                </a:r>
+                <a:endParaRPr lang="en-US" sz="2400" b="1" dirty="0"/>
+              </a:p>
+              <a:p>
+                <a:pPr marL="0" indent="0" algn="ctr">
+                  <a:buNone/>
+                </a:pPr>
+                <a:endParaRPr lang="en-US" sz="2400" b="1" dirty="0"/>
+              </a:p>
+              <a:p>
+                <a:endParaRPr lang="en-US" sz="2400" b="1" dirty="0"/>
+              </a:p>
+            </p:txBody>
+          </p:sp>
+        </mc:Choice>
+        <mc:Fallback xmlns="">
+          <p:sp>
+            <p:nvSpPr>
+              <p:cNvPr id="3" name="Content Placeholder 2">
+                <a:extLst>
+                  <a:ext uri="{FF2B5EF4-FFF2-40B4-BE49-F238E27FC236}">
+                    <a16:creationId xmlns:a16="http://schemas.microsoft.com/office/drawing/2014/main" id="{748E8586-DD23-94D2-D323-FAF1EE2B0EC8}"/>
+                  </a:ext>
+                </a:extLst>
+              </p:cNvPr>
+              <p:cNvSpPr>
+                <a:spLocks noGrp="1" noRot="1" noChangeAspect="1" noMove="1" noResize="1" noEditPoints="1" noAdjustHandles="1" noChangeArrowheads="1" noChangeShapeType="1" noTextEdit="1"/>
+              </p:cNvSpPr>
+              <p:nvPr>
+                <p:ph idx="1"/>
+              </p:nvPr>
+            </p:nvSpPr>
+            <p:spPr>
+              <a:blipFill>
+                <a:blip r:embed="rId2"/>
+                <a:stretch>
+                  <a:fillRect l="-1043" t="-3081" r="-1333"/>
+                </a:stretch>
+              </a:blipFill>
+            </p:spPr>
+            <p:txBody>
+              <a:bodyPr/>
+              <a:lstStyle/>
+              <a:p>
+                <a:r>
+                  <a:rPr lang="en-US">
+                    <a:noFill/>
+                  </a:rPr>
+                  <a:t> </a:t>
+                </a:r>
+              </a:p>
+            </p:txBody>
+          </p:sp>
+        </mc:Fallback>
+      </mc:AlternateContent>
+    </p:spTree>
+    <p:extLst>
+      <p:ext uri="{BB962C8B-B14F-4D97-AF65-F5344CB8AC3E}">
+        <p14:creationId xmlns:p14="http://schemas.microsoft.com/office/powerpoint/2010/main" val="1799798228"/>
+      </p:ext>
+    </p:extLst>
+  </p:cSld>
+  <p:clrMapOvr>
+    <a:masterClrMapping/>
+  </p:clrMapOvr>
+</p:sld>
+</file>
+
+<file path=ppt/slides/slide11.xml><?xml version="1.0" encoding="utf-8"?>
 <p:sld xmlns:a="http://schemas.openxmlformats.org/drawingml/2006/main" xmlns:r="http://schemas.openxmlformats.org/officeDocument/2006/relationships" xmlns:p="http://schemas.openxmlformats.org/presentationml/2006/main">
   <p:cSld>
     <p:spTree>
@@ -3492,16 +3725,7 @@
             </a:pPr>
             <a:r>
               <a:rPr lang="en-US" dirty="0"/>
-              <a:t>Exam Scores {61,61,65,65,66,68,69,73,74,75,76,78,79,90,94}</a:t>
-            </a:r>
-          </a:p>
-          <a:p>
-            <a:pPr marL="0" indent="0">
-              <a:buNone/>
-            </a:pPr>
-            <a:r>
-              <a:rPr lang="en-US" dirty="0"/>
-              <a:t>n=15</a:t>
+              <a:t>Exam Scores 61,61,65,65,66,68,69,73,74,75,76,78,79,90,94</a:t>
             </a:r>
           </a:p>
           <a:p>
@@ -3534,7 +3758,7 @@
 </p:sld>
 </file>
 
-<file path=ppt/slides/slide11.xml><?xml version="1.0" encoding="utf-8"?>
+<file path=ppt/slides/slide12.xml><?xml version="1.0" encoding="utf-8"?>
 <p:sld xmlns:a="http://schemas.openxmlformats.org/drawingml/2006/main" xmlns:r="http://schemas.openxmlformats.org/officeDocument/2006/relationships" xmlns:p="http://schemas.openxmlformats.org/presentationml/2006/main">
   <p:cSld>
     <p:spTree>
@@ -3714,7 +3938,7 @@
 </p:sld>
 </file>
 
-<file path=ppt/slides/slide12.xml><?xml version="1.0" encoding="utf-8"?>
+<file path=ppt/slides/slide13.xml><?xml version="1.0" encoding="utf-8"?>
 <p:sld xmlns:a="http://schemas.openxmlformats.org/drawingml/2006/main" xmlns:r="http://schemas.openxmlformats.org/officeDocument/2006/relationships" xmlns:p="http://schemas.openxmlformats.org/presentationml/2006/main">
   <p:cSld>
     <p:spTree>
@@ -3774,7 +3998,7 @@
 </p:sld>
 </file>
 
-<file path=ppt/slides/slide13.xml><?xml version="1.0" encoding="utf-8"?>
+<file path=ppt/slides/slide14.xml><?xml version="1.0" encoding="utf-8"?>
 <p:sld xmlns:a="http://schemas.openxmlformats.org/drawingml/2006/main" xmlns:r="http://schemas.openxmlformats.org/officeDocument/2006/relationships" xmlns:p="http://schemas.openxmlformats.org/presentationml/2006/main">
   <p:cSld>
     <p:spTree>
@@ -5071,7 +5295,117 @@
 </p:sld>
 </file>
 
-<file path=ppt/slides/slide14.xml><?xml version="1.0" encoding="utf-8"?>
+<file path=ppt/slides/slide15.xml><?xml version="1.0" encoding="utf-8"?>
+<p:sld xmlns:a="http://schemas.openxmlformats.org/drawingml/2006/main" xmlns:r="http://schemas.openxmlformats.org/officeDocument/2006/relationships" xmlns:p="http://schemas.openxmlformats.org/presentationml/2006/main">
+  <p:cSld>
+    <p:spTree>
+      <p:nvGrpSpPr>
+        <p:cNvPr id="1" name=""/>
+        <p:cNvGrpSpPr/>
+        <p:nvPr/>
+      </p:nvGrpSpPr>
+      <p:grpSpPr>
+        <a:xfrm>
+          <a:off x="0" y="0"/>
+          <a:ext cx="0" cy="0"/>
+          <a:chOff x="0" y="0"/>
+          <a:chExt cx="0" cy="0"/>
+        </a:xfrm>
+      </p:grpSpPr>
+      <p:sp>
+        <p:nvSpPr>
+          <p:cNvPr id="2" name="Title 1">
+            <a:extLst>
+              <a:ext uri="{FF2B5EF4-FFF2-40B4-BE49-F238E27FC236}">
+                <a16:creationId xmlns:a16="http://schemas.microsoft.com/office/drawing/2014/main" id="{77CDEDB4-D308-EF0A-43A7-3BA893E1819C}"/>
+              </a:ext>
+            </a:extLst>
+          </p:cNvPr>
+          <p:cNvSpPr>
+            <a:spLocks noGrp="1"/>
+          </p:cNvSpPr>
+          <p:nvPr>
+            <p:ph type="title"/>
+          </p:nvPr>
+        </p:nvSpPr>
+        <p:spPr/>
+        <p:txBody>
+          <a:bodyPr/>
+          <a:lstStyle/>
+          <a:p>
+            <a:r>
+              <a:rPr lang="en-US" dirty="0"/>
+              <a:t>Practice</a:t>
+            </a:r>
+          </a:p>
+        </p:txBody>
+      </p:sp>
+      <p:sp>
+        <p:nvSpPr>
+          <p:cNvPr id="3" name="Content Placeholder 2">
+            <a:extLst>
+              <a:ext uri="{FF2B5EF4-FFF2-40B4-BE49-F238E27FC236}">
+                <a16:creationId xmlns:a16="http://schemas.microsoft.com/office/drawing/2014/main" id="{49F843BF-7D1D-9153-A164-BE2AA5E369E2}"/>
+              </a:ext>
+            </a:extLst>
+          </p:cNvPr>
+          <p:cNvSpPr>
+            <a:spLocks noGrp="1"/>
+          </p:cNvSpPr>
+          <p:nvPr>
+            <p:ph idx="1"/>
+          </p:nvPr>
+        </p:nvSpPr>
+        <p:spPr/>
+        <p:txBody>
+          <a:bodyPr/>
+          <a:lstStyle/>
+          <a:p>
+            <a:pPr marL="0" indent="0">
+              <a:buNone/>
+            </a:pPr>
+            <a:r>
+              <a:rPr lang="en-US" dirty="0"/>
+              <a:t>Construct the boxplot for student exam scores</a:t>
+            </a:r>
+          </a:p>
+          <a:p>
+            <a:pPr marL="0" indent="0">
+              <a:buNone/>
+            </a:pPr>
+            <a:endParaRPr lang="en-US" dirty="0"/>
+          </a:p>
+          <a:p>
+            <a:pPr marL="0" indent="0">
+              <a:buNone/>
+            </a:pPr>
+            <a:r>
+              <a:rPr lang="en-US" dirty="0"/>
+              <a:t>Exam Scores 61,61,65,65,66,68,69,73,74,75,76,78,79,90,94</a:t>
+            </a:r>
+          </a:p>
+          <a:p>
+            <a:pPr marL="0" indent="0">
+              <a:buNone/>
+            </a:pPr>
+            <a:endParaRPr lang="en-US" dirty="0"/>
+          </a:p>
+        </p:txBody>
+      </p:sp>
+    </p:spTree>
+    <p:extLst>
+      <p:ext uri="{BB962C8B-B14F-4D97-AF65-F5344CB8AC3E}">
+        <p14:creationId xmlns:p14="http://schemas.microsoft.com/office/powerpoint/2010/main" val="1946217465"/>
+      </p:ext>
+    </p:extLst>
+  </p:cSld>
+  <p:clrMapOvr>
+    <a:masterClrMapping/>
+  </p:clrMapOvr>
+</p:sld>
+</file>
+
+<file path=ppt/slides/slide16.xml><?xml version="1.0" encoding="utf-8"?>
 <p:sld xmlns:a="http://schemas.openxmlformats.org/drawingml/2006/main" xmlns:r="http://schemas.openxmlformats.org/officeDocument/2006/relationships" xmlns:p="http://schemas.openxmlformats.org/presentationml/2006/main">
   <p:cSld>
     <p:spTree>
@@ -5149,9 +5483,51 @@
           <a:bodyPr/>
           <a:lstStyle/>
           <a:p>
+            <a:pPr marL="0" indent="0">
+              <a:buNone/>
+            </a:pPr>
             <a:r>
               <a:rPr lang="en-US" dirty="0"/>
-              <a:t>Data = -5.7, -2.6, -1.5, -1.3, -0.4, 0.2, 1.5, 2.2, 2.3, 2.6, 2.9, 10.4</a:t>
+              <a:t>Consider the following 12 observations of a quantitative variable X</a:t>
+            </a:r>
+          </a:p>
+          <a:p>
+            <a:pPr marL="0" indent="0">
+              <a:buNone/>
+            </a:pPr>
+            <a:r>
+              <a:rPr lang="en-US" dirty="0"/>
+              <a:t>X = { -5.7, -2.6, -1.5, -1.3, -0.4, 0.2, 1.5, 2.2, 2.3, 2.6, 2.9, 10.4 }</a:t>
+            </a:r>
+          </a:p>
+          <a:p>
+            <a:pPr marL="0" indent="0">
+              <a:buNone/>
+            </a:pPr>
+            <a:endParaRPr lang="en-US" dirty="0"/>
+          </a:p>
+          <a:p>
+            <a:pPr marL="0" indent="0">
+              <a:buNone/>
+            </a:pPr>
+            <a:r>
+              <a:rPr lang="en-US" dirty="0"/>
+              <a:t>Compute the 5 number summary and draw a boxplot</a:t>
+            </a:r>
+          </a:p>
+          <a:p>
+            <a:pPr marL="0" indent="0">
+              <a:buNone/>
+            </a:pPr>
+            <a:endParaRPr lang="en-US" dirty="0"/>
+          </a:p>
+          <a:p>
+            <a:pPr marL="0" indent="0">
+              <a:buNone/>
+            </a:pPr>
+            <a:r>
+              <a:rPr lang="en-US" dirty="0"/>
+              <a:t>Compare the IQR with the range</a:t>
             </a:r>
           </a:p>
         </p:txBody>
@@ -5169,7 +5545,7 @@
 </p:sld>
 </file>
 
-<file path=ppt/slides/slide15.xml><?xml version="1.0" encoding="utf-8"?>
+<file path=ppt/slides/slide17.xml><?xml version="1.0" encoding="utf-8"?>
 <p:sld xmlns:a="http://schemas.openxmlformats.org/drawingml/2006/main" xmlns:r="http://schemas.openxmlformats.org/officeDocument/2006/relationships" xmlns:p="http://schemas.openxmlformats.org/presentationml/2006/main">
   <p:cSld>
     <p:spTree>
@@ -5473,87 +5849,7 @@
 </p:sld>
 </file>
 
-<file path=ppt/slides/slide16.xml><?xml version="1.0" encoding="utf-8"?>
-<p:sld xmlns:a="http://schemas.openxmlformats.org/drawingml/2006/main" xmlns:r="http://schemas.openxmlformats.org/officeDocument/2006/relationships" xmlns:p="http://schemas.openxmlformats.org/presentationml/2006/main">
-  <p:cSld>
-    <p:spTree>
-      <p:nvGrpSpPr>
-        <p:cNvPr id="1" name=""/>
-        <p:cNvGrpSpPr/>
-        <p:nvPr/>
-      </p:nvGrpSpPr>
-      <p:grpSpPr>
-        <a:xfrm>
-          <a:off x="0" y="0"/>
-          <a:ext cx="0" cy="0"/>
-          <a:chOff x="0" y="0"/>
-          <a:chExt cx="0" cy="0"/>
-        </a:xfrm>
-      </p:grpSpPr>
-      <p:sp>
-        <p:nvSpPr>
-          <p:cNvPr id="2" name="Title 1">
-            <a:extLst>
-              <a:ext uri="{FF2B5EF4-FFF2-40B4-BE49-F238E27FC236}">
-                <a16:creationId xmlns:a16="http://schemas.microsoft.com/office/drawing/2014/main" id="{5962E4B2-9C4F-379D-4AD5-5675B992FB9B}"/>
-              </a:ext>
-            </a:extLst>
-          </p:cNvPr>
-          <p:cNvSpPr>
-            <a:spLocks noGrp="1"/>
-          </p:cNvSpPr>
-          <p:nvPr>
-            <p:ph type="title"/>
-          </p:nvPr>
-        </p:nvSpPr>
-        <p:spPr/>
-        <p:txBody>
-          <a:bodyPr/>
-          <a:lstStyle/>
-          <a:p>
-            <a:endParaRPr lang="en-US"/>
-          </a:p>
-        </p:txBody>
-      </p:sp>
-      <p:sp>
-        <p:nvSpPr>
-          <p:cNvPr id="3" name="Content Placeholder 2">
-            <a:extLst>
-              <a:ext uri="{FF2B5EF4-FFF2-40B4-BE49-F238E27FC236}">
-                <a16:creationId xmlns:a16="http://schemas.microsoft.com/office/drawing/2014/main" id="{66673EAC-ECD9-9E28-E373-91D36E48A747}"/>
-              </a:ext>
-            </a:extLst>
-          </p:cNvPr>
-          <p:cNvSpPr>
-            <a:spLocks noGrp="1"/>
-          </p:cNvSpPr>
-          <p:nvPr>
-            <p:ph idx="1"/>
-          </p:nvPr>
-        </p:nvSpPr>
-        <p:spPr/>
-        <p:txBody>
-          <a:bodyPr/>
-          <a:lstStyle/>
-          <a:p>
-            <a:endParaRPr lang="en-US"/>
-          </a:p>
-        </p:txBody>
-      </p:sp>
-    </p:spTree>
-    <p:extLst>
-      <p:ext uri="{BB962C8B-B14F-4D97-AF65-F5344CB8AC3E}">
-        <p14:creationId xmlns:p14="http://schemas.microsoft.com/office/powerpoint/2010/main" val="1207896125"/>
-      </p:ext>
-    </p:extLst>
-  </p:cSld>
-  <p:clrMapOvr>
-    <a:masterClrMapping/>
-  </p:clrMapOvr>
-</p:sld>
-</file>
-
-<file path=ppt/slides/slide17.xml><?xml version="1.0" encoding="utf-8"?>
+<file path=ppt/slides/slide18.xml><?xml version="1.0" encoding="utf-8"?>
 <p:sld xmlns:a="http://schemas.openxmlformats.org/drawingml/2006/main" xmlns:r="http://schemas.openxmlformats.org/officeDocument/2006/relationships" xmlns:p="http://schemas.openxmlformats.org/presentationml/2006/main">
   <p:cSld>
     <p:spTree>
@@ -6142,7 +6438,7 @@
 </p:sld>
 </file>
 
-<file path=ppt/slides/slide18.xml><?xml version="1.0" encoding="utf-8"?>
+<file path=ppt/slides/slide19.xml><?xml version="1.0" encoding="utf-8"?>
 <p:sld xmlns:a="http://schemas.openxmlformats.org/drawingml/2006/main" xmlns:r="http://schemas.openxmlformats.org/officeDocument/2006/relationships" xmlns:p="http://schemas.openxmlformats.org/presentationml/2006/main">
   <p:cSld>
     <p:spTree>
@@ -6921,7 +7217,195 @@
 </p:sld>
 </file>
 
-<file path=ppt/slides/slide19.xml><?xml version="1.0" encoding="utf-8"?>
+<file path=ppt/slides/slide2.xml><?xml version="1.0" encoding="utf-8"?>
+<p:sld xmlns:a="http://schemas.openxmlformats.org/drawingml/2006/main" xmlns:r="http://schemas.openxmlformats.org/officeDocument/2006/relationships" xmlns:p="http://schemas.openxmlformats.org/presentationml/2006/main">
+  <p:cSld>
+    <p:spTree>
+      <p:nvGrpSpPr>
+        <p:cNvPr id="1" name=""/>
+        <p:cNvGrpSpPr/>
+        <p:nvPr/>
+      </p:nvGrpSpPr>
+      <p:grpSpPr>
+        <a:xfrm>
+          <a:off x="0" y="0"/>
+          <a:ext cx="0" cy="0"/>
+          <a:chOff x="0" y="0"/>
+          <a:chExt cx="0" cy="0"/>
+        </a:xfrm>
+      </p:grpSpPr>
+      <p:sp>
+        <p:nvSpPr>
+          <p:cNvPr id="2" name="Title 1">
+            <a:extLst>
+              <a:ext uri="{FF2B5EF4-FFF2-40B4-BE49-F238E27FC236}">
+                <a16:creationId xmlns:a16="http://schemas.microsoft.com/office/drawing/2014/main" id="{B69814C7-501D-6E5F-A6A6-DB317C7D65BB}"/>
+              </a:ext>
+            </a:extLst>
+          </p:cNvPr>
+          <p:cNvSpPr>
+            <a:spLocks noGrp="1"/>
+          </p:cNvSpPr>
+          <p:nvPr>
+            <p:ph type="title"/>
+          </p:nvPr>
+        </p:nvSpPr>
+        <p:spPr/>
+        <p:txBody>
+          <a:bodyPr/>
+          <a:lstStyle/>
+          <a:p>
+            <a:r>
+              <a:rPr lang="en-US" dirty="0"/>
+              <a:t>Review</a:t>
+            </a:r>
+          </a:p>
+        </p:txBody>
+      </p:sp>
+      <p:sp>
+        <p:nvSpPr>
+          <p:cNvPr id="3" name="Content Placeholder 2">
+            <a:extLst>
+              <a:ext uri="{FF2B5EF4-FFF2-40B4-BE49-F238E27FC236}">
+                <a16:creationId xmlns:a16="http://schemas.microsoft.com/office/drawing/2014/main" id="{5F9B8ED3-1C8A-EEFD-DA97-C58941FA5B9E}"/>
+              </a:ext>
+            </a:extLst>
+          </p:cNvPr>
+          <p:cNvSpPr>
+            <a:spLocks noGrp="1"/>
+          </p:cNvSpPr>
+          <p:nvPr>
+            <p:ph idx="1"/>
+          </p:nvPr>
+        </p:nvSpPr>
+        <p:spPr/>
+        <p:txBody>
+          <a:bodyPr>
+            <a:normAutofit fontScale="92500" lnSpcReduction="10000"/>
+          </a:bodyPr>
+          <a:lstStyle/>
+          <a:p>
+            <a:pPr marL="0" indent="0">
+              <a:buNone/>
+            </a:pPr>
+            <a:r>
+              <a:rPr lang="en-US" dirty="0"/>
+              <a:t>Describing the shape of distribution</a:t>
+            </a:r>
+          </a:p>
+          <a:p>
+            <a:pPr lvl="2"/>
+            <a:r>
+              <a:rPr lang="en-US" dirty="0"/>
+              <a:t>How many peaks? Unimodal, bimodal, multimodal</a:t>
+            </a:r>
+          </a:p>
+          <a:p>
+            <a:pPr lvl="2"/>
+            <a:r>
+              <a:rPr lang="en-US" dirty="0"/>
+              <a:t>Is the distribution symmetric or is it skewed?</a:t>
+            </a:r>
+          </a:p>
+          <a:p>
+            <a:pPr lvl="2"/>
+            <a:r>
+              <a:rPr lang="en-US" dirty="0"/>
+              <a:t>Are there outliers in the data?</a:t>
+            </a:r>
+          </a:p>
+          <a:p>
+            <a:pPr marL="0" indent="0">
+              <a:buNone/>
+            </a:pPr>
+            <a:endParaRPr lang="en-US" dirty="0"/>
+          </a:p>
+          <a:p>
+            <a:pPr marL="0" indent="0">
+              <a:buNone/>
+            </a:pPr>
+            <a:r>
+              <a:rPr lang="en-US" dirty="0"/>
+              <a:t>Two numbers to describe the center of distribution:</a:t>
+            </a:r>
+          </a:p>
+          <a:p>
+            <a:pPr lvl="2"/>
+            <a:r>
+              <a:rPr lang="en-US" b="1" dirty="0"/>
+              <a:t>Mean</a:t>
+            </a:r>
+            <a:r>
+              <a:rPr lang="en-US" dirty="0"/>
+              <a:t> the average value of a distribution – it is NOT resistant to outliers</a:t>
+            </a:r>
+            <a:endParaRPr lang="en-US" b="1" dirty="0"/>
+          </a:p>
+          <a:p>
+            <a:pPr lvl="2"/>
+            <a:r>
+              <a:rPr lang="en-US" b="1" dirty="0"/>
+              <a:t>Median </a:t>
+            </a:r>
+            <a:r>
+              <a:rPr lang="en-US" dirty="0"/>
+              <a:t>the middle value of a distribution – it is resistant to outliers</a:t>
+            </a:r>
+          </a:p>
+          <a:p>
+            <a:pPr marL="0" indent="0">
+              <a:buNone/>
+            </a:pPr>
+            <a:endParaRPr lang="en-US" dirty="0"/>
+          </a:p>
+          <a:p>
+            <a:pPr marL="0" indent="0">
+              <a:buNone/>
+            </a:pPr>
+            <a:r>
+              <a:rPr lang="en-US" dirty="0"/>
+              <a:t>The </a:t>
+            </a:r>
+            <a:r>
+              <a:rPr lang="en-US" b="1" dirty="0"/>
+              <a:t>mode </a:t>
+            </a:r>
+            <a:r>
+              <a:rPr lang="en-US" dirty="0"/>
+              <a:t>is a measure of location</a:t>
+            </a:r>
+          </a:p>
+          <a:p>
+            <a:pPr lvl="2"/>
+            <a:r>
+              <a:rPr lang="en-US" dirty="0"/>
+              <a:t>It describes the position of commonly occurring values (</a:t>
+            </a:r>
+            <a:r>
+              <a:rPr lang="en-US" dirty="0" err="1"/>
+              <a:t>i.e</a:t>
+            </a:r>
+            <a:r>
+              <a:rPr lang="en-US" dirty="0"/>
+              <a:t> the position of peaks in the distribution)</a:t>
+            </a:r>
+          </a:p>
+        </p:txBody>
+      </p:sp>
+    </p:spTree>
+    <p:extLst>
+      <p:ext uri="{BB962C8B-B14F-4D97-AF65-F5344CB8AC3E}">
+        <p14:creationId xmlns:p14="http://schemas.microsoft.com/office/powerpoint/2010/main" val="3747072180"/>
+      </p:ext>
+    </p:extLst>
+  </p:cSld>
+  <p:clrMapOvr>
+    <a:masterClrMapping/>
+  </p:clrMapOvr>
+</p:sld>
+</file>
+
+<file path=ppt/slides/slide20.xml><?xml version="1.0" encoding="utf-8"?>
 <p:sld xmlns:a="http://schemas.openxmlformats.org/drawingml/2006/main" xmlns:r="http://schemas.openxmlformats.org/officeDocument/2006/relationships" xmlns:p="http://schemas.openxmlformats.org/presentationml/2006/main">
   <p:cSld>
     <p:spTree>
@@ -7395,195 +7879,7 @@
 </p:sld>
 </file>
 
-<file path=ppt/slides/slide2.xml><?xml version="1.0" encoding="utf-8"?>
-<p:sld xmlns:a="http://schemas.openxmlformats.org/drawingml/2006/main" xmlns:r="http://schemas.openxmlformats.org/officeDocument/2006/relationships" xmlns:p="http://schemas.openxmlformats.org/presentationml/2006/main">
-  <p:cSld>
-    <p:spTree>
-      <p:nvGrpSpPr>
-        <p:cNvPr id="1" name=""/>
-        <p:cNvGrpSpPr/>
-        <p:nvPr/>
-      </p:nvGrpSpPr>
-      <p:grpSpPr>
-        <a:xfrm>
-          <a:off x="0" y="0"/>
-          <a:ext cx="0" cy="0"/>
-          <a:chOff x="0" y="0"/>
-          <a:chExt cx="0" cy="0"/>
-        </a:xfrm>
-      </p:grpSpPr>
-      <p:sp>
-        <p:nvSpPr>
-          <p:cNvPr id="2" name="Title 1">
-            <a:extLst>
-              <a:ext uri="{FF2B5EF4-FFF2-40B4-BE49-F238E27FC236}">
-                <a16:creationId xmlns:a16="http://schemas.microsoft.com/office/drawing/2014/main" id="{B69814C7-501D-6E5F-A6A6-DB317C7D65BB}"/>
-              </a:ext>
-            </a:extLst>
-          </p:cNvPr>
-          <p:cNvSpPr>
-            <a:spLocks noGrp="1"/>
-          </p:cNvSpPr>
-          <p:nvPr>
-            <p:ph type="title"/>
-          </p:nvPr>
-        </p:nvSpPr>
-        <p:spPr/>
-        <p:txBody>
-          <a:bodyPr/>
-          <a:lstStyle/>
-          <a:p>
-            <a:r>
-              <a:rPr lang="en-US" dirty="0"/>
-              <a:t>Review</a:t>
-            </a:r>
-          </a:p>
-        </p:txBody>
-      </p:sp>
-      <p:sp>
-        <p:nvSpPr>
-          <p:cNvPr id="3" name="Content Placeholder 2">
-            <a:extLst>
-              <a:ext uri="{FF2B5EF4-FFF2-40B4-BE49-F238E27FC236}">
-                <a16:creationId xmlns:a16="http://schemas.microsoft.com/office/drawing/2014/main" id="{5F9B8ED3-1C8A-EEFD-DA97-C58941FA5B9E}"/>
-              </a:ext>
-            </a:extLst>
-          </p:cNvPr>
-          <p:cNvSpPr>
-            <a:spLocks noGrp="1"/>
-          </p:cNvSpPr>
-          <p:nvPr>
-            <p:ph idx="1"/>
-          </p:nvPr>
-        </p:nvSpPr>
-        <p:spPr/>
-        <p:txBody>
-          <a:bodyPr>
-            <a:normAutofit fontScale="92500" lnSpcReduction="10000"/>
-          </a:bodyPr>
-          <a:lstStyle/>
-          <a:p>
-            <a:pPr marL="0" indent="0">
-              <a:buNone/>
-            </a:pPr>
-            <a:r>
-              <a:rPr lang="en-US" dirty="0"/>
-              <a:t>Describing the shape of distribution</a:t>
-            </a:r>
-          </a:p>
-          <a:p>
-            <a:pPr lvl="2"/>
-            <a:r>
-              <a:rPr lang="en-US" dirty="0"/>
-              <a:t>How many peaks? Unimodal, bimodal, multimodal</a:t>
-            </a:r>
-          </a:p>
-          <a:p>
-            <a:pPr lvl="2"/>
-            <a:r>
-              <a:rPr lang="en-US" dirty="0"/>
-              <a:t>Is the distribution symmetric or is it skewed?</a:t>
-            </a:r>
-          </a:p>
-          <a:p>
-            <a:pPr lvl="2"/>
-            <a:r>
-              <a:rPr lang="en-US" dirty="0"/>
-              <a:t>Are there outliers in the data?</a:t>
-            </a:r>
-          </a:p>
-          <a:p>
-            <a:pPr marL="0" indent="0">
-              <a:buNone/>
-            </a:pPr>
-            <a:endParaRPr lang="en-US" dirty="0"/>
-          </a:p>
-          <a:p>
-            <a:pPr marL="0" indent="0">
-              <a:buNone/>
-            </a:pPr>
-            <a:r>
-              <a:rPr lang="en-US" dirty="0"/>
-              <a:t>Two numbers to describe the center of distribution:</a:t>
-            </a:r>
-          </a:p>
-          <a:p>
-            <a:pPr lvl="2"/>
-            <a:r>
-              <a:rPr lang="en-US" b="1" dirty="0"/>
-              <a:t>Mean</a:t>
-            </a:r>
-            <a:r>
-              <a:rPr lang="en-US" dirty="0"/>
-              <a:t> the average value of a distribution – it is NOT resistant to outliers</a:t>
-            </a:r>
-            <a:endParaRPr lang="en-US" b="1" dirty="0"/>
-          </a:p>
-          <a:p>
-            <a:pPr lvl="2"/>
-            <a:r>
-              <a:rPr lang="en-US" b="1" dirty="0"/>
-              <a:t>Median </a:t>
-            </a:r>
-            <a:r>
-              <a:rPr lang="en-US" dirty="0"/>
-              <a:t>the middle value of a distribution – it is resistant to outliers</a:t>
-            </a:r>
-          </a:p>
-          <a:p>
-            <a:pPr marL="0" indent="0">
-              <a:buNone/>
-            </a:pPr>
-            <a:endParaRPr lang="en-US" dirty="0"/>
-          </a:p>
-          <a:p>
-            <a:pPr marL="0" indent="0">
-              <a:buNone/>
-            </a:pPr>
-            <a:r>
-              <a:rPr lang="en-US" dirty="0"/>
-              <a:t>The </a:t>
-            </a:r>
-            <a:r>
-              <a:rPr lang="en-US" b="1" dirty="0"/>
-              <a:t>mode </a:t>
-            </a:r>
-            <a:r>
-              <a:rPr lang="en-US" dirty="0"/>
-              <a:t>is a measure of location</a:t>
-            </a:r>
-          </a:p>
-          <a:p>
-            <a:pPr lvl="2"/>
-            <a:r>
-              <a:rPr lang="en-US" dirty="0"/>
-              <a:t>It describes the position of commonly occurring values (</a:t>
-            </a:r>
-            <a:r>
-              <a:rPr lang="en-US" dirty="0" err="1"/>
-              <a:t>i.e</a:t>
-            </a:r>
-            <a:r>
-              <a:rPr lang="en-US" dirty="0"/>
-              <a:t> the position of peaks in the distribution)</a:t>
-            </a:r>
-          </a:p>
-        </p:txBody>
-      </p:sp>
-    </p:spTree>
-    <p:extLst>
-      <p:ext uri="{BB962C8B-B14F-4D97-AF65-F5344CB8AC3E}">
-        <p14:creationId xmlns:p14="http://schemas.microsoft.com/office/powerpoint/2010/main" val="3747072180"/>
-      </p:ext>
-    </p:extLst>
-  </p:cSld>
-  <p:clrMapOvr>
-    <a:masterClrMapping/>
-  </p:clrMapOvr>
-</p:sld>
-</file>
-
-<file path=ppt/slides/slide20.xml><?xml version="1.0" encoding="utf-8"?>
+<file path=ppt/slides/slide21.xml><?xml version="1.0" encoding="utf-8"?>
 <p:sld xmlns:a="http://schemas.openxmlformats.org/drawingml/2006/main" xmlns:r="http://schemas.openxmlformats.org/officeDocument/2006/relationships" xmlns:p="http://schemas.openxmlformats.org/presentationml/2006/main">
   <p:cSld>
     <p:spTree>
@@ -7947,7 +8243,7 @@
 </p:sld>
 </file>
 
-<file path=ppt/slides/slide21.xml><?xml version="1.0" encoding="utf-8"?>
+<file path=ppt/slides/slide22.xml><?xml version="1.0" encoding="utf-8"?>
 <p:sld xmlns:a="http://schemas.openxmlformats.org/drawingml/2006/main" xmlns:r="http://schemas.openxmlformats.org/officeDocument/2006/relationships" xmlns:p="http://schemas.openxmlformats.org/presentationml/2006/main">
   <p:cSld>
     <p:bg>
@@ -11620,6 +11916,131 @@
           <p:cNvPr id="2" name="Title 1">
             <a:extLst>
               <a:ext uri="{FF2B5EF4-FFF2-40B4-BE49-F238E27FC236}">
+                <a16:creationId xmlns:a16="http://schemas.microsoft.com/office/drawing/2014/main" id="{B589C3C6-C810-835B-54A4-E5A4037C1C25}"/>
+              </a:ext>
+            </a:extLst>
+          </p:cNvPr>
+          <p:cNvSpPr>
+            <a:spLocks noGrp="1"/>
+          </p:cNvSpPr>
+          <p:nvPr>
+            <p:ph type="title"/>
+          </p:nvPr>
+        </p:nvSpPr>
+        <p:spPr/>
+        <p:txBody>
+          <a:bodyPr/>
+          <a:lstStyle/>
+          <a:p>
+            <a:r>
+              <a:rPr lang="en-US" dirty="0"/>
+              <a:t>Practice</a:t>
+            </a:r>
+          </a:p>
+        </p:txBody>
+      </p:sp>
+      <p:sp>
+        <p:nvSpPr>
+          <p:cNvPr id="3" name="Content Placeholder 2">
+            <a:extLst>
+              <a:ext uri="{FF2B5EF4-FFF2-40B4-BE49-F238E27FC236}">
+                <a16:creationId xmlns:a16="http://schemas.microsoft.com/office/drawing/2014/main" id="{307FDE7D-C54C-9F70-498E-F05F62BAA59A}"/>
+              </a:ext>
+            </a:extLst>
+          </p:cNvPr>
+          <p:cNvSpPr>
+            <a:spLocks noGrp="1"/>
+          </p:cNvSpPr>
+          <p:nvPr>
+            <p:ph idx="1"/>
+          </p:nvPr>
+        </p:nvSpPr>
+        <p:spPr/>
+        <p:txBody>
+          <a:bodyPr/>
+          <a:lstStyle/>
+          <a:p>
+            <a:pPr marL="0" indent="0">
+              <a:buNone/>
+            </a:pPr>
+            <a:r>
+              <a:rPr lang="en-US" dirty="0"/>
+              <a:t>Consider the following 15 exam scores of students in a statistics course</a:t>
+            </a:r>
+          </a:p>
+          <a:p>
+            <a:pPr marL="0" indent="0">
+              <a:buNone/>
+            </a:pPr>
+            <a:endParaRPr lang="en-US" dirty="0"/>
+          </a:p>
+          <a:p>
+            <a:pPr marL="0" indent="0">
+              <a:buNone/>
+            </a:pPr>
+            <a:r>
+              <a:rPr lang="en-US" dirty="0"/>
+              <a:t>61,61,65,65,66,68,69,73,74,75,76,78,79,90,94</a:t>
+            </a:r>
+          </a:p>
+          <a:p>
+            <a:pPr marL="0" indent="0">
+              <a:buNone/>
+            </a:pPr>
+            <a:endParaRPr lang="en-US" dirty="0"/>
+          </a:p>
+          <a:p>
+            <a:pPr marL="0" indent="0">
+              <a:buNone/>
+            </a:pPr>
+            <a:endParaRPr lang="en-US" dirty="0"/>
+          </a:p>
+          <a:p>
+            <a:pPr marL="0" indent="0">
+              <a:buNone/>
+            </a:pPr>
+            <a:r>
+              <a:rPr lang="en-US" dirty="0"/>
+              <a:t>Compute the 3 quartiles Q1, Q2, and Q3</a:t>
+            </a:r>
+          </a:p>
+        </p:txBody>
+      </p:sp>
+    </p:spTree>
+    <p:extLst>
+      <p:ext uri="{BB962C8B-B14F-4D97-AF65-F5344CB8AC3E}">
+        <p14:creationId xmlns:p14="http://schemas.microsoft.com/office/powerpoint/2010/main" val="3343363296"/>
+      </p:ext>
+    </p:extLst>
+  </p:cSld>
+  <p:clrMapOvr>
+    <a:masterClrMapping/>
+  </p:clrMapOvr>
+</p:sld>
+</file>
+
+<file path=ppt/slides/slide8.xml><?xml version="1.0" encoding="utf-8"?>
+<p:sld xmlns:a="http://schemas.openxmlformats.org/drawingml/2006/main" xmlns:r="http://schemas.openxmlformats.org/officeDocument/2006/relationships" xmlns:p="http://schemas.openxmlformats.org/presentationml/2006/main">
+  <p:cSld>
+    <p:spTree>
+      <p:nvGrpSpPr>
+        <p:cNvPr id="1" name=""/>
+        <p:cNvGrpSpPr/>
+        <p:nvPr/>
+      </p:nvGrpSpPr>
+      <p:grpSpPr>
+        <a:xfrm>
+          <a:off x="0" y="0"/>
+          <a:ext cx="0" cy="0"/>
+          <a:chOff x="0" y="0"/>
+          <a:chExt cx="0" cy="0"/>
+        </a:xfrm>
+      </p:grpSpPr>
+      <p:sp>
+        <p:nvSpPr>
+          <p:cNvPr id="2" name="Title 1">
+            <a:extLst>
+              <a:ext uri="{FF2B5EF4-FFF2-40B4-BE49-F238E27FC236}">
                 <a16:creationId xmlns:a16="http://schemas.microsoft.com/office/drawing/2014/main" id="{96B6764E-1650-762B-5308-1049092EAE9A}"/>
               </a:ext>
             </a:extLst>
@@ -11686,7 +12107,7 @@
 </p:sld>
 </file>
 
-<file path=ppt/slides/slide8.xml><?xml version="1.0" encoding="utf-8"?>
+<file path=ppt/slides/slide9.xml><?xml version="1.0" encoding="utf-8"?>
 <p:sld xmlns:a="http://schemas.openxmlformats.org/drawingml/2006/main" xmlns:r="http://schemas.openxmlformats.org/officeDocument/2006/relationships" xmlns:p="http://schemas.openxmlformats.org/presentationml/2006/main">
   <p:cSld>
     <p:spTree>
@@ -11893,263 +12314,6 @@
     <p:extLst>
       <p:ext uri="{BB962C8B-B14F-4D97-AF65-F5344CB8AC3E}">
         <p14:creationId xmlns:p14="http://schemas.microsoft.com/office/powerpoint/2010/main" val="3729869338"/>
-      </p:ext>
-    </p:extLst>
-  </p:cSld>
-  <p:clrMapOvr>
-    <a:masterClrMapping/>
-  </p:clrMapOvr>
-</p:sld>
-</file>
-
-<file path=ppt/slides/slide9.xml><?xml version="1.0" encoding="utf-8"?>
-<p:sld xmlns:a="http://schemas.openxmlformats.org/drawingml/2006/main" xmlns:r="http://schemas.openxmlformats.org/officeDocument/2006/relationships" xmlns:p="http://schemas.openxmlformats.org/presentationml/2006/main">
-  <p:cSld>
-    <p:spTree>
-      <p:nvGrpSpPr>
-        <p:cNvPr id="1" name=""/>
-        <p:cNvGrpSpPr/>
-        <p:nvPr/>
-      </p:nvGrpSpPr>
-      <p:grpSpPr>
-        <a:xfrm>
-          <a:off x="0" y="0"/>
-          <a:ext cx="0" cy="0"/>
-          <a:chOff x="0" y="0"/>
-          <a:chExt cx="0" cy="0"/>
-        </a:xfrm>
-      </p:grpSpPr>
-      <p:sp>
-        <p:nvSpPr>
-          <p:cNvPr id="2" name="Title 1">
-            <a:extLst>
-              <a:ext uri="{FF2B5EF4-FFF2-40B4-BE49-F238E27FC236}">
-                <a16:creationId xmlns:a16="http://schemas.microsoft.com/office/drawing/2014/main" id="{506D6BCC-CAB3-F735-AC9E-6A7940310802}"/>
-              </a:ext>
-            </a:extLst>
-          </p:cNvPr>
-          <p:cNvSpPr>
-            <a:spLocks noGrp="1"/>
-          </p:cNvSpPr>
-          <p:nvPr>
-            <p:ph type="title"/>
-          </p:nvPr>
-        </p:nvSpPr>
-        <p:spPr/>
-        <p:txBody>
-          <a:bodyPr/>
-          <a:lstStyle/>
-          <a:p>
-            <a:r>
-              <a:rPr lang="en-US" sz="4400" dirty="0"/>
-              <a:t>Measures of Spread: Interquartile Range</a:t>
-            </a:r>
-            <a:endParaRPr lang="en-US" dirty="0"/>
-          </a:p>
-        </p:txBody>
-      </p:sp>
-      <mc:AlternateContent xmlns:mc="http://schemas.openxmlformats.org/markup-compatibility/2006">
-        <mc:Choice xmlns:a14="http://schemas.microsoft.com/office/drawing/2010/main" Requires="a14">
-          <p:sp>
-            <p:nvSpPr>
-              <p:cNvPr id="3" name="Content Placeholder 2">
-                <a:extLst>
-                  <a:ext uri="{FF2B5EF4-FFF2-40B4-BE49-F238E27FC236}">
-                    <a16:creationId xmlns:a16="http://schemas.microsoft.com/office/drawing/2014/main" id="{748E8586-DD23-94D2-D323-FAF1EE2B0EC8}"/>
-                  </a:ext>
-                </a:extLst>
-              </p:cNvPr>
-              <p:cNvSpPr>
-                <a:spLocks noGrp="1"/>
-              </p:cNvSpPr>
-              <p:nvPr>
-                <p:ph idx="1"/>
-              </p:nvPr>
-            </p:nvSpPr>
-            <p:spPr/>
-            <p:txBody>
-              <a:bodyPr>
-                <a:normAutofit lnSpcReduction="10000"/>
-              </a:bodyPr>
-              <a:lstStyle/>
-              <a:p>
-                <a:r>
-                  <a:rPr lang="en-US" dirty="0"/>
-                  <a:t>The </a:t>
-                </a:r>
-                <a:r>
-                  <a:rPr lang="en-US" b="1" dirty="0"/>
-                  <a:t>interquartile range (IQR)</a:t>
-                </a:r>
-                <a:r>
-                  <a:rPr lang="en-US" dirty="0"/>
-                  <a:t> measures the spread of the middle 50% of the observations </a:t>
-                </a:r>
-              </a:p>
-              <a:p>
-                <a:endParaRPr lang="en-US" dirty="0"/>
-              </a:p>
-              <a:p>
-                <a:r>
-                  <a:rPr lang="en-US" dirty="0"/>
-                  <a:t>It is resistant to outliers</a:t>
-                </a:r>
-              </a:p>
-              <a:p>
-                <a:pPr marL="0" indent="0" algn="ctr">
-                  <a:buNone/>
-                </a:pPr>
-                <a:endParaRPr lang="en-US" sz="2400" b="1" i="1" dirty="0">
-                  <a:latin typeface="Cambria Math" panose="02040503050406030204" pitchFamily="18" charset="0"/>
-                </a:endParaRPr>
-              </a:p>
-              <a:p>
-                <a:pPr marL="0" indent="0" algn="ctr">
-                  <a:buNone/>
-                </a:pPr>
-                <a14:m>
-                  <m:oMathPara xmlns:m="http://schemas.openxmlformats.org/officeDocument/2006/math">
-                    <m:oMathParaPr>
-                      <m:jc m:val="centerGroup"/>
-                    </m:oMathParaPr>
-                    <m:oMath xmlns:m="http://schemas.openxmlformats.org/officeDocument/2006/math">
-                      <m:r>
-                        <a:rPr lang="en-US" sz="2400" b="1" i="1" smtClean="0">
-                          <a:latin typeface="Cambria Math" panose="02040503050406030204" pitchFamily="18" charset="0"/>
-                        </a:rPr>
-                        <m:t>𝑰𝑸𝑹</m:t>
-                      </m:r>
-                      <m:r>
-                        <a:rPr lang="en-US" sz="2400" b="1" i="1" smtClean="0">
-                          <a:latin typeface="Cambria Math" panose="02040503050406030204" pitchFamily="18" charset="0"/>
-                        </a:rPr>
-                        <m:t>=</m:t>
-                      </m:r>
-                      <m:r>
-                        <a:rPr lang="en-US" sz="2400" b="1" i="1" smtClean="0">
-                          <a:latin typeface="Cambria Math" panose="02040503050406030204" pitchFamily="18" charset="0"/>
-                        </a:rPr>
-                        <m:t>𝑸</m:t>
-                      </m:r>
-                      <m:r>
-                        <a:rPr lang="en-US" sz="2400" b="1" i="1" smtClean="0">
-                          <a:latin typeface="Cambria Math" panose="02040503050406030204" pitchFamily="18" charset="0"/>
-                        </a:rPr>
-                        <m:t>𝟑</m:t>
-                      </m:r>
-                      <m:r>
-                        <a:rPr lang="en-US" sz="2400" b="1" i="1" smtClean="0">
-                          <a:latin typeface="Cambria Math" panose="02040503050406030204" pitchFamily="18" charset="0"/>
-                        </a:rPr>
-                        <m:t> −</m:t>
-                      </m:r>
-                      <m:r>
-                        <a:rPr lang="en-US" sz="2400" b="1" i="1" smtClean="0">
-                          <a:latin typeface="Cambria Math" panose="02040503050406030204" pitchFamily="18" charset="0"/>
-                        </a:rPr>
-                        <m:t>𝑸</m:t>
-                      </m:r>
-                      <m:r>
-                        <a:rPr lang="en-US" sz="2400" b="1" i="1" smtClean="0">
-                          <a:latin typeface="Cambria Math" panose="02040503050406030204" pitchFamily="18" charset="0"/>
-                        </a:rPr>
-                        <m:t>𝟏</m:t>
-                      </m:r>
-                    </m:oMath>
-                  </m:oMathPara>
-                </a14:m>
-                <a:endParaRPr lang="en-US" sz="2400" b="1" dirty="0"/>
-              </a:p>
-              <a:p>
-                <a:pPr marL="0" indent="0" algn="ctr">
-                  <a:buNone/>
-                </a:pPr>
-                <a:endParaRPr lang="en-US" sz="2400" b="1" dirty="0"/>
-              </a:p>
-              <a:p>
-                <a:r>
-                  <a:rPr lang="en-US" sz="2400" dirty="0"/>
-                  <a:t>The more variability the larger the value of the </a:t>
-                </a:r>
-                <a:r>
-                  <a:rPr lang="en-US" sz="2400" b="1" dirty="0"/>
-                  <a:t>IQR</a:t>
-                </a:r>
-                <a:r>
-                  <a:rPr lang="en-US" sz="2400" dirty="0"/>
-                  <a:t> </a:t>
-                </a:r>
-              </a:p>
-              <a:p>
-                <a:endParaRPr lang="en-US" sz="2400" dirty="0"/>
-              </a:p>
-              <a:p>
-                <a:r>
-                  <a:rPr lang="en-US" sz="2400" b="1" dirty="0"/>
-                  <a:t>IQR </a:t>
-                </a:r>
-                <a:r>
-                  <a:rPr lang="en-US" sz="2400" dirty="0"/>
-                  <a:t>is a good choice for distributions that are highly skewed!</a:t>
-                </a:r>
-                <a:endParaRPr lang="en-US" sz="2400" b="1" dirty="0"/>
-              </a:p>
-              <a:p>
-                <a:pPr marL="0" indent="0" algn="ctr">
-                  <a:buNone/>
-                </a:pPr>
-                <a:endParaRPr lang="en-US" sz="2400" b="1" dirty="0"/>
-              </a:p>
-              <a:p>
-                <a:endParaRPr lang="en-US" sz="2400" b="1" dirty="0"/>
-              </a:p>
-            </p:txBody>
-          </p:sp>
-        </mc:Choice>
-        <mc:Fallback>
-          <p:sp>
-            <p:nvSpPr>
-              <p:cNvPr id="3" name="Content Placeholder 2">
-                <a:extLst>
-                  <a:ext uri="{FF2B5EF4-FFF2-40B4-BE49-F238E27FC236}">
-                    <a16:creationId xmlns:a16="http://schemas.microsoft.com/office/drawing/2014/main" id="{748E8586-DD23-94D2-D323-FAF1EE2B0EC8}"/>
-                  </a:ext>
-                </a:extLst>
-              </p:cNvPr>
-              <p:cNvSpPr>
-                <a:spLocks noGrp="1" noRot="1" noChangeAspect="1" noMove="1" noResize="1" noEditPoints="1" noAdjustHandles="1" noChangeArrowheads="1" noChangeShapeType="1" noTextEdit="1"/>
-              </p:cNvSpPr>
-              <p:nvPr>
-                <p:ph idx="1"/>
-              </p:nvPr>
-            </p:nvSpPr>
-            <p:spPr>
-              <a:blipFill>
-                <a:blip r:embed="rId2"/>
-                <a:stretch>
-                  <a:fillRect l="-1043" t="-3081" r="-1333"/>
-                </a:stretch>
-              </a:blipFill>
-            </p:spPr>
-            <p:txBody>
-              <a:bodyPr/>
-              <a:lstStyle/>
-              <a:p>
-                <a:r>
-                  <a:rPr lang="en-US">
-                    <a:noFill/>
-                  </a:rPr>
-                  <a:t> </a:t>
-                </a:r>
-              </a:p>
-            </p:txBody>
-          </p:sp>
-        </mc:Fallback>
-      </mc:AlternateContent>
-    </p:spTree>
-    <p:extLst>
-      <p:ext uri="{BB962C8B-B14F-4D97-AF65-F5344CB8AC3E}">
-        <p14:creationId xmlns:p14="http://schemas.microsoft.com/office/powerpoint/2010/main" val="1799798228"/>
       </p:ext>
     </p:extLst>
   </p:cSld>

</xml_diff>